<commit_message>
Add in tk canvas files from python path
</commit_message>
<xml_diff>
--- a/one_session_overview/Introduction_Overview.pptx
+++ b/one_session_overview/Introduction_Overview.pptx
@@ -270,7 +270,7 @@
           <a:p>
             <a:fld id="{A7D9A7DC-F1CD-4708-A473-876A4B3B8934}" type="datetime1">
               <a:rPr lang="en-US" smtClean="0"/>
-              <a:t>4/13/2022</a:t>
+              <a:t>10/9/2023</a:t>
             </a:fld>
             <a:endParaRPr lang="en-US" dirty="0"/>
           </a:p>
@@ -454,7 +454,7 @@
           <a:p>
             <a:fld id="{A596092B-28C7-44D1-B902-5437B333DFB7}" type="datetime1">
               <a:rPr lang="en-US" smtClean="0"/>
-              <a:t>4/13/2022</a:t>
+              <a:t>10/9/2023</a:t>
             </a:fld>
             <a:endParaRPr lang="en-US" dirty="0"/>
           </a:p>
@@ -812,7 +812,7 @@
           <a:p>
             <a:fld id="{A596092B-28C7-44D1-B902-5437B333DFB7}" type="datetime1">
               <a:rPr lang="en-US" smtClean="0"/>
-              <a:t>4/13/2022</a:t>
+              <a:t>10/9/2023</a:t>
             </a:fld>
             <a:endParaRPr lang="en-US" dirty="0"/>
           </a:p>
@@ -963,7 +963,7 @@
           <a:p>
             <a:fld id="{A596092B-28C7-44D1-B902-5437B333DFB7}" type="datetime1">
               <a:rPr lang="en-US" smtClean="0"/>
-              <a:t>4/13/2022</a:t>
+              <a:t>10/9/2023</a:t>
             </a:fld>
             <a:endParaRPr lang="en-US" dirty="0"/>
           </a:p>
@@ -1114,7 +1114,7 @@
           <a:p>
             <a:fld id="{A596092B-28C7-44D1-B902-5437B333DFB7}" type="datetime1">
               <a:rPr lang="en-US" smtClean="0"/>
-              <a:t>4/13/2022</a:t>
+              <a:t>10/9/2023</a:t>
             </a:fld>
             <a:endParaRPr lang="en-US" dirty="0"/>
           </a:p>
@@ -1265,7 +1265,7 @@
           <a:p>
             <a:fld id="{A596092B-28C7-44D1-B902-5437B333DFB7}" type="datetime1">
               <a:rPr lang="en-US" smtClean="0"/>
-              <a:t>4/13/2022</a:t>
+              <a:t>10/9/2023</a:t>
             </a:fld>
             <a:endParaRPr lang="en-US" dirty="0"/>
           </a:p>
@@ -1416,7 +1416,7 @@
           <a:p>
             <a:fld id="{A596092B-28C7-44D1-B902-5437B333DFB7}" type="datetime1">
               <a:rPr lang="en-US" smtClean="0"/>
-              <a:t>4/13/2022</a:t>
+              <a:t>10/9/2023</a:t>
             </a:fld>
             <a:endParaRPr lang="en-US" dirty="0"/>
           </a:p>
@@ -1585,7 +1585,7 @@
           <a:p>
             <a:fld id="{A596092B-28C7-44D1-B902-5437B333DFB7}" type="datetime1">
               <a:rPr lang="en-US" smtClean="0"/>
-              <a:t>4/13/2022</a:t>
+              <a:t>10/9/2023</a:t>
             </a:fld>
             <a:endParaRPr lang="en-US" dirty="0"/>
           </a:p>
@@ -1831,7 +1831,7 @@
                 <a:tabLst/>
                 <a:defRPr/>
               </a:pPr>
-              <a:t>4/13/2022</a:t>
+              <a:t>10/9/2023</a:t>
             </a:fld>
             <a:endParaRPr kumimoji="0" lang="en-US" sz="1200" b="0" i="0" u="none" strike="noStrike" kern="1200" cap="none" spc="0" normalizeH="0" baseline="0" noProof="0" dirty="0">
               <a:ln>
@@ -2177,7 +2177,7 @@
                 <a:tabLst/>
                 <a:defRPr/>
               </a:pPr>
-              <a:t>4/13/2022</a:t>
+              <a:t>10/9/2023</a:t>
             </a:fld>
             <a:endParaRPr kumimoji="0" lang="en-US" sz="1200" b="0" i="0" u="none" strike="noStrike" kern="1200" cap="none" spc="0" normalizeH="0" baseline="0" noProof="0" dirty="0">
               <a:ln>
@@ -2538,7 +2538,7 @@
                 <a:tabLst/>
                 <a:defRPr/>
               </a:pPr>
-              <a:t>4/13/2022</a:t>
+              <a:t>10/9/2023</a:t>
             </a:fld>
             <a:endParaRPr kumimoji="0" lang="en-US" sz="1200" b="0" i="0" u="none" strike="noStrike" kern="1200" cap="none" spc="0" normalizeH="0" baseline="0" noProof="0" dirty="0">
               <a:ln>
@@ -2890,7 +2890,7 @@
                 <a:tabLst/>
                 <a:defRPr/>
               </a:pPr>
-              <a:t>4/13/2022</a:t>
+              <a:t>10/9/2023</a:t>
             </a:fld>
             <a:endParaRPr kumimoji="0" lang="en-US" sz="1200" b="0" i="0" u="none" strike="noStrike" kern="1200" cap="none" spc="0" normalizeH="0" baseline="0" noProof="0" dirty="0">
               <a:ln>
@@ -3221,7 +3221,7 @@
                 <a:tabLst/>
                 <a:defRPr/>
               </a:pPr>
-              <a:t>4/13/2022</a:t>
+              <a:t>10/9/2023</a:t>
             </a:fld>
             <a:endParaRPr kumimoji="0" lang="en-US" sz="1200" b="0" i="0" u="none" strike="noStrike" kern="1200" cap="none" spc="0" normalizeH="0" baseline="0" noProof="0" dirty="0">
               <a:ln>
@@ -3493,7 +3493,7 @@
           <a:p>
             <a:fld id="{A596092B-28C7-44D1-B902-5437B333DFB7}" type="datetime1">
               <a:rPr lang="en-US" smtClean="0"/>
-              <a:t>4/13/2022</a:t>
+              <a:t>10/9/2023</a:t>
             </a:fld>
             <a:endParaRPr lang="en-US" dirty="0"/>
           </a:p>
@@ -3728,7 +3728,7 @@
                 <a:tabLst/>
                 <a:defRPr/>
               </a:pPr>
-              <a:t>4/13/2022</a:t>
+              <a:t>10/9/2023</a:t>
             </a:fld>
             <a:endParaRPr kumimoji="0" lang="en-US" sz="1200" b="0" i="0" u="none" strike="noStrike" kern="1200" cap="none" spc="0" normalizeH="0" baseline="0" noProof="0" dirty="0">
               <a:ln>
@@ -4066,7 +4066,7 @@
                 <a:tabLst/>
                 <a:defRPr/>
               </a:pPr>
-              <a:t>4/13/2022</a:t>
+              <a:t>10/9/2023</a:t>
             </a:fld>
             <a:endParaRPr kumimoji="0" lang="en-US" sz="1200" b="0" i="0" u="none" strike="noStrike" kern="1200" cap="none" spc="0" normalizeH="0" baseline="0" noProof="0" dirty="0">
               <a:ln>
@@ -4320,7 +4320,7 @@
           <a:p>
             <a:fld id="{A596092B-28C7-44D1-B902-5437B333DFB7}" type="datetime1">
               <a:rPr lang="en-US" smtClean="0"/>
-              <a:t>4/13/2022</a:t>
+              <a:t>10/9/2023</a:t>
             </a:fld>
             <a:endParaRPr lang="en-US" dirty="0"/>
           </a:p>
@@ -4474,7 +4474,7 @@
           <a:p>
             <a:fld id="{A596092B-28C7-44D1-B902-5437B333DFB7}" type="datetime1">
               <a:rPr lang="en-US" smtClean="0"/>
-              <a:t>4/13/2022</a:t>
+              <a:t>10/9/2023</a:t>
             </a:fld>
             <a:endParaRPr lang="en-US" dirty="0"/>
           </a:p>
@@ -4628,7 +4628,7 @@
           <a:p>
             <a:fld id="{A596092B-28C7-44D1-B902-5437B333DFB7}" type="datetime1">
               <a:rPr lang="en-US" smtClean="0"/>
-              <a:t>4/13/2022</a:t>
+              <a:t>10/9/2023</a:t>
             </a:fld>
             <a:endParaRPr lang="en-US" dirty="0"/>
           </a:p>
@@ -4779,7 +4779,7 @@
           <a:p>
             <a:fld id="{A596092B-28C7-44D1-B902-5437B333DFB7}" type="datetime1">
               <a:rPr lang="en-US" smtClean="0"/>
-              <a:t>4/13/2022</a:t>
+              <a:t>10/9/2023</a:t>
             </a:fld>
             <a:endParaRPr lang="en-US" dirty="0"/>
           </a:p>
@@ -4933,7 +4933,7 @@
           <a:p>
             <a:fld id="{A596092B-28C7-44D1-B902-5437B333DFB7}" type="datetime1">
               <a:rPr lang="en-US" smtClean="0"/>
-              <a:t>4/13/2022</a:t>
+              <a:t>10/9/2023</a:t>
             </a:fld>
             <a:endParaRPr lang="en-US" dirty="0"/>
           </a:p>
@@ -5093,7 +5093,7 @@
           <a:p>
             <a:fld id="{A596092B-28C7-44D1-B902-5437B333DFB7}" type="datetime1">
               <a:rPr lang="en-US" smtClean="0"/>
-              <a:t>4/13/2022</a:t>
+              <a:t>10/9/2023</a:t>
             </a:fld>
             <a:endParaRPr lang="en-US" dirty="0"/>
           </a:p>
@@ -5247,7 +5247,7 @@
           <a:p>
             <a:fld id="{A596092B-28C7-44D1-B902-5437B333DFB7}" type="datetime1">
               <a:rPr lang="en-US" smtClean="0"/>
-              <a:t>4/13/2022</a:t>
+              <a:t>10/9/2023</a:t>
             </a:fld>
             <a:endParaRPr lang="en-US" dirty="0"/>
           </a:p>
@@ -5401,7 +5401,7 @@
           <a:p>
             <a:fld id="{A596092B-28C7-44D1-B902-5437B333DFB7}" type="datetime1">
               <a:rPr lang="en-US" smtClean="0"/>
-              <a:t>4/13/2022</a:t>
+              <a:t>10/9/2023</a:t>
             </a:fld>
             <a:endParaRPr lang="en-US" dirty="0"/>
           </a:p>
@@ -6187,7 +6187,7 @@
           <a:p>
             <a:fld id="{B1DF5501-EE91-4443-9D3B-24E6F28D34E2}" type="datetime1">
               <a:rPr lang="en-US" smtClean="0"/>
-              <a:t>4/13/2022</a:t>
+              <a:t>10/9/2023</a:t>
             </a:fld>
             <a:endParaRPr lang="en-US" dirty="0"/>
           </a:p>
@@ -6453,7 +6453,7 @@
           <a:p>
             <a:fld id="{E954E1E9-8456-43AD-BA28-861520D256B9}" type="datetime1">
               <a:rPr lang="en-US" smtClean="0"/>
-              <a:t>4/13/2022</a:t>
+              <a:t>10/9/2023</a:t>
             </a:fld>
             <a:endParaRPr lang="en-US" dirty="0"/>
           </a:p>
@@ -6771,7 +6771,7 @@
           <a:p>
             <a:fld id="{FAF31E0C-AAFD-4E63-B3AE-16CD757951F4}" type="datetime1">
               <a:rPr lang="en-US" smtClean="0"/>
-              <a:t>4/13/2022</a:t>
+              <a:t>10/9/2023</a:t>
             </a:fld>
             <a:endParaRPr lang="en-US" dirty="0"/>
           </a:p>
@@ -7116,7 +7116,7 @@
           <a:p>
             <a:fld id="{000084FF-4715-4B6E-BD22-453621E5873F}" type="datetime1">
               <a:rPr lang="en-US" smtClean="0"/>
-              <a:t>4/13/2022</a:t>
+              <a:t>10/9/2023</a:t>
             </a:fld>
             <a:endParaRPr lang="en-US" dirty="0"/>
           </a:p>
@@ -7434,7 +7434,7 @@
           <a:p>
             <a:fld id="{6AC37F8D-4DF5-4AB6-A766-5A84B3D74A3B}" type="datetime1">
               <a:rPr lang="en-US" smtClean="0"/>
-              <a:t>4/13/2022</a:t>
+              <a:t>10/9/2023</a:t>
             </a:fld>
             <a:endParaRPr lang="en-US" dirty="0"/>
           </a:p>
@@ -7831,7 +7831,7 @@
           <a:p>
             <a:fld id="{1BF3CD1A-162D-40B2-9B22-9056F77C27F2}" type="datetime1">
               <a:rPr lang="en-US" smtClean="0"/>
-              <a:t>4/13/2022</a:t>
+              <a:t>10/9/2023</a:t>
             </a:fld>
             <a:endParaRPr lang="en-US" dirty="0"/>
           </a:p>
@@ -8005,7 +8005,7 @@
           <a:p>
             <a:fld id="{D42E4200-B1E5-4E39-8279-05DD69810A37}" type="datetime1">
               <a:rPr lang="en-US" smtClean="0"/>
-              <a:t>4/13/2022</a:t>
+              <a:t>10/9/2023</a:t>
             </a:fld>
             <a:endParaRPr lang="en-US" dirty="0"/>
           </a:p>
@@ -8188,7 +8188,7 @@
           <a:p>
             <a:fld id="{47CF7895-00AC-42E5-9790-7B0E3CE09DF2}" type="datetime1">
               <a:rPr lang="en-US" smtClean="0"/>
-              <a:t>4/13/2022</a:t>
+              <a:t>10/9/2023</a:t>
             </a:fld>
             <a:endParaRPr lang="en-US" dirty="0"/>
           </a:p>
@@ -8367,7 +8367,7 @@
           <a:p>
             <a:fld id="{A7119916-CD40-456D-ABE3-55F8822671F7}" type="datetime1">
               <a:rPr lang="en-US" smtClean="0"/>
-              <a:t>4/13/2022</a:t>
+              <a:t>10/9/2023</a:t>
             </a:fld>
             <a:endParaRPr lang="en-US" dirty="0"/>
           </a:p>
@@ -8617,7 +8617,7 @@
           <a:p>
             <a:fld id="{3F9A13D6-B8C2-463B-B3F7-C62E098B328E}" type="datetime1">
               <a:rPr lang="en-US" smtClean="0"/>
-              <a:t>4/13/2022</a:t>
+              <a:t>10/9/2023</a:t>
             </a:fld>
             <a:endParaRPr lang="en-US" dirty="0"/>
           </a:p>
@@ -8852,7 +8852,7 @@
           <a:p>
             <a:fld id="{D2B63420-31EE-4E4B-911C-2601B14D9FDD}" type="datetime1">
               <a:rPr lang="en-US" smtClean="0"/>
-              <a:t>4/13/2022</a:t>
+              <a:t>10/9/2023</a:t>
             </a:fld>
             <a:endParaRPr lang="en-US" dirty="0"/>
           </a:p>
@@ -9229,7 +9229,7 @@
           <a:p>
             <a:fld id="{2DD8986D-86F8-41E6-8CFF-8C91AEF92622}" type="datetime1">
               <a:rPr lang="en-US" smtClean="0"/>
-              <a:t>4/13/2022</a:t>
+              <a:t>10/9/2023</a:t>
             </a:fld>
             <a:endParaRPr lang="en-US" dirty="0"/>
           </a:p>
@@ -9355,7 +9355,7 @@
           <a:p>
             <a:fld id="{BA885161-032E-4C6A-8EDA-39D168DF18E4}" type="datetime1">
               <a:rPr lang="en-US" smtClean="0"/>
-              <a:t>4/13/2022</a:t>
+              <a:t>10/9/2023</a:t>
             </a:fld>
             <a:endParaRPr lang="en-US" dirty="0"/>
           </a:p>
@@ -9453,7 +9453,7 @@
           <a:p>
             <a:fld id="{958E6740-E523-48D9-9C4E-6F218E87BAF3}" type="datetime1">
               <a:rPr lang="en-US" smtClean="0"/>
-              <a:t>4/13/2022</a:t>
+              <a:t>10/9/2023</a:t>
             </a:fld>
             <a:endParaRPr lang="en-US" dirty="0"/>
           </a:p>
@@ -9711,7 +9711,7 @@
           <a:p>
             <a:fld id="{6121D4CA-FF09-4CB8-8D51-2613D19A0F2E}" type="datetime1">
               <a:rPr lang="en-US" smtClean="0"/>
-              <a:t>4/13/2022</a:t>
+              <a:t>10/9/2023</a:t>
             </a:fld>
             <a:endParaRPr lang="en-US" dirty="0"/>
           </a:p>
@@ -9976,7 +9976,7 @@
           <a:p>
             <a:fld id="{8C4779EA-AEA7-43B3-9B65-A77E9A890421}" type="datetime1">
               <a:rPr lang="en-US" smtClean="0"/>
-              <a:t>4/13/2022</a:t>
+              <a:t>10/9/2023</a:t>
             </a:fld>
             <a:endParaRPr lang="en-US" dirty="0"/>
           </a:p>
@@ -10722,7 +10722,7 @@
           <a:p>
             <a:fld id="{059A67F1-3EA0-4026-BE6A-31EE4E1B1DB5}" type="datetime1">
               <a:rPr lang="en-US" smtClean="0"/>
-              <a:t>4/13/2022</a:t>
+              <a:t>10/9/2023</a:t>
             </a:fld>
             <a:endParaRPr lang="en-US" dirty="0"/>
           </a:p>
@@ -11319,7 +11319,7 @@
           <a:p>
             <a:fld id="{0F09E55C-CECE-4F47-839C-0667B2307420}" type="datetime1">
               <a:rPr lang="en-US" smtClean="0"/>
-              <a:t>4/13/2022</a:t>
+              <a:t>10/9/2023</a:t>
             </a:fld>
             <a:endParaRPr lang="en-US" dirty="0"/>
           </a:p>
@@ -11644,7 +11644,7 @@
           <a:p>
             <a:fld id="{F8F3720D-B69F-4A94-83B7-6D73A5F7EAD8}" type="datetime1">
               <a:rPr lang="en-US" smtClean="0"/>
-              <a:t>4/13/2022</a:t>
+              <a:t>10/9/2023</a:t>
             </a:fld>
             <a:endParaRPr lang="en-US" dirty="0"/>
           </a:p>
@@ -11846,7 +11846,7 @@
           <a:p>
             <a:fld id="{A7119916-CD40-456D-ABE3-55F8822671F7}" type="datetime1">
               <a:rPr lang="en-US" smtClean="0"/>
-              <a:t>4/13/2022</a:t>
+              <a:t>10/9/2023</a:t>
             </a:fld>
             <a:endParaRPr lang="en-US" dirty="0"/>
           </a:p>
@@ -12071,7 +12071,7 @@
           <a:p>
             <a:fld id="{0B07C6D0-642C-4A40-B0F1-13ED56048173}" type="datetime1">
               <a:rPr lang="en-US" smtClean="0"/>
-              <a:t>4/13/2022</a:t>
+              <a:t>10/9/2023</a:t>
             </a:fld>
             <a:endParaRPr lang="en-US" dirty="0"/>
           </a:p>
@@ -12292,7 +12292,7 @@
           <a:p>
             <a:fld id="{0B07C6D0-642C-4A40-B0F1-13ED56048173}" type="datetime1">
               <a:rPr lang="en-US" smtClean="0"/>
-              <a:t>4/13/2022</a:t>
+              <a:t>10/9/2023</a:t>
             </a:fld>
             <a:endParaRPr lang="en-US" dirty="0"/>
           </a:p>
@@ -12496,7 +12496,7 @@
           <a:p>
             <a:fld id="{A7119916-CD40-456D-ABE3-55F8822671F7}" type="datetime1">
               <a:rPr lang="en-US" smtClean="0"/>
-              <a:t>4/13/2022</a:t>
+              <a:t>10/9/2023</a:t>
             </a:fld>
             <a:endParaRPr lang="en-US" dirty="0"/>
           </a:p>
@@ -12706,7 +12706,7 @@
           <a:p>
             <a:fld id="{0B07C6D0-642C-4A40-B0F1-13ED56048173}" type="datetime1">
               <a:rPr lang="en-US" smtClean="0"/>
-              <a:t>4/13/2022</a:t>
+              <a:t>10/9/2023</a:t>
             </a:fld>
             <a:endParaRPr lang="en-US" dirty="0"/>
           </a:p>
@@ -12882,7 +12882,7 @@
           <a:p>
             <a:fld id="{A7119916-CD40-456D-ABE3-55F8822671F7}" type="datetime1">
               <a:rPr lang="en-US" smtClean="0"/>
-              <a:t>4/13/2022</a:t>
+              <a:t>10/9/2023</a:t>
             </a:fld>
             <a:endParaRPr lang="en-US" dirty="0"/>
           </a:p>
@@ -13124,7 +13124,7 @@
           <a:p>
             <a:fld id="{A7119916-CD40-456D-ABE3-55F8822671F7}" type="datetime1">
               <a:rPr lang="en-US" smtClean="0"/>
-              <a:t>4/13/2022</a:t>
+              <a:t>10/9/2023</a:t>
             </a:fld>
             <a:endParaRPr lang="en-US" dirty="0"/>
           </a:p>
@@ -13424,7 +13424,7 @@
           <a:p>
             <a:fld id="{A7119916-CD40-456D-ABE3-55F8822671F7}" type="datetime1">
               <a:rPr lang="en-US" smtClean="0"/>
-              <a:t>4/13/2022</a:t>
+              <a:t>10/9/2023</a:t>
             </a:fld>
             <a:endParaRPr lang="en-US" dirty="0"/>
           </a:p>
@@ -13697,7 +13697,7 @@
           <a:p>
             <a:fld id="{A7119916-CD40-456D-ABE3-55F8822671F7}" type="datetime1">
               <a:rPr lang="en-US" smtClean="0"/>
-              <a:t>4/13/2022</a:t>
+              <a:t>10/9/2023</a:t>
             </a:fld>
             <a:endParaRPr lang="en-US" dirty="0"/>
           </a:p>
@@ -13923,7 +13923,7 @@
           <a:p>
             <a:fld id="{17F33E47-61B9-4B4D-8325-8788C9EC3005}" type="datetime1">
               <a:rPr lang="en-US" smtClean="0"/>
-              <a:t>4/13/2022</a:t>
+              <a:t>10/9/2023</a:t>
             </a:fld>
             <a:endParaRPr lang="en-US" dirty="0"/>
           </a:p>
@@ -14174,7 +14174,7 @@
           <a:p>
             <a:fld id="{A7119916-CD40-456D-ABE3-55F8822671F7}" type="datetime1">
               <a:rPr lang="en-US" smtClean="0"/>
-              <a:t>4/13/2022</a:t>
+              <a:t>10/9/2023</a:t>
             </a:fld>
             <a:endParaRPr lang="en-US" dirty="0"/>
           </a:p>
@@ -14468,7 +14468,7 @@
           <a:p>
             <a:fld id="{A7119916-CD40-456D-ABE3-55F8822671F7}" type="datetime1">
               <a:rPr lang="en-US" smtClean="0"/>
-              <a:t>4/13/2022</a:t>
+              <a:t>10/9/2023</a:t>
             </a:fld>
             <a:endParaRPr lang="en-US" dirty="0"/>
           </a:p>
@@ -14726,7 +14726,7 @@
           <a:p>
             <a:fld id="{A7119916-CD40-456D-ABE3-55F8822671F7}" type="datetime1">
               <a:rPr lang="en-US" smtClean="0"/>
-              <a:t>4/13/2022</a:t>
+              <a:t>10/9/2023</a:t>
             </a:fld>
             <a:endParaRPr lang="en-US" dirty="0"/>
           </a:p>
@@ -15046,7 +15046,7 @@
           <a:p>
             <a:fld id="{A7119916-CD40-456D-ABE3-55F8822671F7}" type="datetime1">
               <a:rPr lang="en-US" smtClean="0"/>
-              <a:t>4/13/2022</a:t>
+              <a:t>10/9/2023</a:t>
             </a:fld>
             <a:endParaRPr lang="en-US" dirty="0"/>
           </a:p>
@@ -15315,7 +15315,7 @@
           <a:p>
             <a:fld id="{A7119916-CD40-456D-ABE3-55F8822671F7}" type="datetime1">
               <a:rPr lang="en-US" smtClean="0"/>
-              <a:t>4/13/2022</a:t>
+              <a:t>10/9/2023</a:t>
             </a:fld>
             <a:endParaRPr lang="en-US" dirty="0"/>
           </a:p>
@@ -15573,7 +15573,7 @@
           <a:p>
             <a:fld id="{A7119916-CD40-456D-ABE3-55F8822671F7}" type="datetime1">
               <a:rPr lang="en-US" smtClean="0"/>
-              <a:t>4/13/2022</a:t>
+              <a:t>10/9/2023</a:t>
             </a:fld>
             <a:endParaRPr lang="en-US" dirty="0"/>
           </a:p>
@@ -15822,7 +15822,7 @@
           <a:p>
             <a:fld id="{A7119916-CD40-456D-ABE3-55F8822671F7}" type="datetime1">
               <a:rPr lang="en-US" smtClean="0"/>
-              <a:t>4/13/2022</a:t>
+              <a:t>10/9/2023</a:t>
             </a:fld>
             <a:endParaRPr lang="en-US" dirty="0"/>
           </a:p>
@@ -16171,7 +16171,7 @@
           <a:p>
             <a:fld id="{0B07C6D0-642C-4A40-B0F1-13ED56048173}" type="datetime1">
               <a:rPr lang="en-US" smtClean="0"/>
-              <a:t>4/13/2022</a:t>
+              <a:t>10/9/2023</a:t>
             </a:fld>
             <a:endParaRPr lang="en-US" dirty="0"/>
           </a:p>
@@ -16525,7 +16525,7 @@
           <a:p>
             <a:fld id="{0B07C6D0-642C-4A40-B0F1-13ED56048173}" type="datetime1">
               <a:rPr lang="en-US" smtClean="0"/>
-              <a:t>4/13/2022</a:t>
+              <a:t>10/9/2023</a:t>
             </a:fld>
             <a:endParaRPr lang="en-US" dirty="0"/>
           </a:p>
@@ -16714,7 +16714,7 @@
           <a:p>
             <a:fld id="{A7119916-CD40-456D-ABE3-55F8822671F7}" type="datetime1">
               <a:rPr lang="en-US" smtClean="0"/>
-              <a:t>4/13/2022</a:t>
+              <a:t>10/9/2023</a:t>
             </a:fld>
             <a:endParaRPr lang="en-US" dirty="0"/>
           </a:p>
@@ -16908,7 +16908,7 @@
           <a:p>
             <a:fld id="{B428F5A7-20F3-4981-866F-DD0AA3B623E8}" type="datetime1">
               <a:rPr lang="en-US" smtClean="0"/>
-              <a:t>4/13/2022</a:t>
+              <a:t>10/9/2023</a:t>
             </a:fld>
             <a:endParaRPr lang="en-US" dirty="0"/>
           </a:p>
@@ -17208,7 +17208,7 @@
                 <a:tabLst/>
                 <a:defRPr/>
               </a:pPr>
-              <a:t>4/13/2022</a:t>
+              <a:t>10/9/2023</a:t>
             </a:fld>
             <a:endParaRPr kumimoji="0" lang="en-US" sz="900" b="0" i="0" u="none" strike="noStrike" kern="1200" cap="none" spc="0" normalizeH="0" baseline="0" noProof="0" dirty="0">
               <a:ln>
@@ -17570,7 +17570,7 @@
                 <a:tabLst/>
                 <a:defRPr/>
               </a:pPr>
-              <a:t>4/13/2022</a:t>
+              <a:t>10/9/2023</a:t>
             </a:fld>
             <a:endParaRPr kumimoji="0" lang="en-US" sz="900" b="0" i="0" u="none" strike="noStrike" kern="1200" cap="none" spc="0" normalizeH="0" baseline="0" noProof="0" dirty="0">
               <a:ln>
@@ -17939,7 +17939,7 @@
                 <a:tabLst/>
                 <a:defRPr/>
               </a:pPr>
-              <a:t>4/13/2022</a:t>
+              <a:t>10/9/2023</a:t>
             </a:fld>
             <a:endParaRPr kumimoji="0" lang="en-US" sz="900" b="0" i="0" u="none" strike="noStrike" kern="1200" cap="none" spc="0" normalizeH="0" baseline="0" noProof="0" dirty="0">
               <a:ln>
@@ -18444,7 +18444,7 @@
                 <a:tabLst/>
                 <a:defRPr/>
               </a:pPr>
-              <a:t>4/13/2022</a:t>
+              <a:t>10/9/2023</a:t>
             </a:fld>
             <a:endParaRPr kumimoji="0" lang="en-US" sz="900" b="0" i="0" u="none" strike="noStrike" kern="1200" cap="none" spc="0" normalizeH="0" baseline="0" noProof="0" dirty="0">
               <a:ln>
@@ -18762,7 +18762,7 @@
           <a:p>
             <a:fld id="{A7119916-CD40-456D-ABE3-55F8822671F7}" type="datetime1">
               <a:rPr lang="en-US" smtClean="0"/>
-              <a:t>4/13/2022</a:t>
+              <a:t>10/9/2023</a:t>
             </a:fld>
             <a:endParaRPr lang="en-US" dirty="0"/>
           </a:p>
@@ -19032,7 +19032,7 @@
                 <a:tabLst/>
                 <a:defRPr/>
               </a:pPr>
-              <a:t>4/13/2022</a:t>
+              <a:t>10/9/2023</a:t>
             </a:fld>
             <a:endParaRPr kumimoji="0" lang="en-US" sz="900" b="0" i="0" u="none" strike="noStrike" kern="1200" cap="none" spc="0" normalizeH="0" baseline="0" noProof="0" dirty="0">
               <a:ln>
@@ -19402,7 +19402,7 @@
                 <a:tabLst/>
                 <a:defRPr/>
               </a:pPr>
-              <a:t>4/13/2022</a:t>
+              <a:t>10/9/2023</a:t>
             </a:fld>
             <a:endParaRPr kumimoji="0" lang="en-US" sz="900" b="0" i="0" u="none" strike="noStrike" kern="1200" cap="none" spc="0" normalizeH="0" baseline="0" noProof="0" dirty="0">
               <a:ln>
@@ -19839,7 +19839,7 @@
                 <a:tabLst/>
                 <a:defRPr/>
               </a:pPr>
-              <a:t>4/13/2022</a:t>
+              <a:t>10/9/2023</a:t>
             </a:fld>
             <a:endParaRPr kumimoji="0" lang="en-US" sz="900" b="0" i="0" u="none" strike="noStrike" kern="1200" cap="none" spc="0" normalizeH="0" baseline="0" noProof="0" dirty="0">
               <a:ln>
@@ -20225,7 +20225,7 @@
                 <a:tabLst/>
                 <a:defRPr/>
               </a:pPr>
-              <a:t>4/13/2022</a:t>
+              <a:t>10/9/2023</a:t>
             </a:fld>
             <a:endParaRPr kumimoji="0" lang="en-US" sz="900" b="0" i="0" u="none" strike="noStrike" kern="1200" cap="none" spc="0" normalizeH="0" baseline="0" noProof="0" dirty="0">
               <a:ln>
@@ -20516,7 +20516,7 @@
           <a:p>
             <a:fld id="{A7119916-CD40-456D-ABE3-55F8822671F7}" type="datetime1">
               <a:rPr lang="en-US" smtClean="0"/>
-              <a:t>4/13/2022</a:t>
+              <a:t>10/9/2023</a:t>
             </a:fld>
             <a:endParaRPr lang="en-US" dirty="0"/>
           </a:p>
@@ -20737,7 +20737,7 @@
           <a:p>
             <a:fld id="{17F33E47-61B9-4B4D-8325-8788C9EC3005}" type="datetime1">
               <a:rPr lang="en-US" smtClean="0"/>
-              <a:t>4/13/2022</a:t>
+              <a:t>10/9/2023</a:t>
             </a:fld>
             <a:endParaRPr lang="en-US" dirty="0"/>
           </a:p>
@@ -20888,7 +20888,7 @@
           <a:p>
             <a:fld id="{A7119916-CD40-456D-ABE3-55F8822671F7}" type="datetime1">
               <a:rPr lang="en-US" smtClean="0"/>
-              <a:t>4/13/2022</a:t>
+              <a:t>10/9/2023</a:t>
             </a:fld>
             <a:endParaRPr lang="en-US" dirty="0"/>
           </a:p>
@@ -21141,7 +21141,7 @@
           <a:p>
             <a:fld id="{0B07C6D0-642C-4A40-B0F1-13ED56048173}" type="datetime1">
               <a:rPr lang="en-US" smtClean="0"/>
-              <a:t>4/13/2022</a:t>
+              <a:t>10/9/2023</a:t>
             </a:fld>
             <a:endParaRPr lang="en-US" dirty="0"/>
           </a:p>
@@ -21385,7 +21385,7 @@
           <a:p>
             <a:fld id="{A7119916-CD40-456D-ABE3-55F8822671F7}" type="datetime1">
               <a:rPr lang="en-US" smtClean="0"/>
-              <a:t>4/13/2022</a:t>
+              <a:t>10/9/2023</a:t>
             </a:fld>
             <a:endParaRPr lang="en-US" dirty="0"/>
           </a:p>
@@ -21494,9 +21494,16 @@
             <p:ph type="title"/>
           </p:nvPr>
         </p:nvSpPr>
-        <p:spPr/>
-        <p:txBody>
-          <a:bodyPr/>
+        <p:spPr>
+          <a:xfrm>
+            <a:off x="677334" y="609599"/>
+            <a:ext cx="8596668" cy="1637211"/>
+          </a:xfrm>
+        </p:spPr>
+        <p:txBody>
+          <a:bodyPr>
+            <a:normAutofit fontScale="90000"/>
+          </a:bodyPr>
           <a:lstStyle/>
           <a:p>
             <a:pPr algn="ctr"/>
@@ -21509,7 +21516,14 @@
             </a:br>
             <a:r>
               <a:rPr lang="en-US" dirty="0"/>
-              <a:t> Telling the Computer What to Do</a:t>
+              <a:t> Telling  a Story</a:t>
+            </a:r>
+            <a:br>
+              <a:rPr lang="en-US" dirty="0"/>
+            </a:br>
+            <a:r>
+              <a:rPr lang="en-US" dirty="0"/>
+              <a:t>Telling the Computer What to Do</a:t>
             </a:r>
           </a:p>
         </p:txBody>
@@ -21530,7 +21544,12 @@
             <p:ph idx="1"/>
           </p:nvPr>
         </p:nvSpPr>
-        <p:spPr/>
+        <p:spPr>
+          <a:xfrm>
+            <a:off x="677334" y="2325189"/>
+            <a:ext cx="8596668" cy="3716173"/>
+          </a:xfrm>
+        </p:spPr>
         <p:txBody>
           <a:bodyPr>
             <a:noAutofit/>
@@ -21592,7 +21611,7 @@
           <a:p>
             <a:fld id="{52E41419-A9A0-4E48-99EF-6542B4AE3C79}" type="datetime1">
               <a:rPr lang="en-US" smtClean="0"/>
-              <a:t>4/13/2022</a:t>
+              <a:t>10/9/2023</a:t>
             </a:fld>
             <a:endParaRPr lang="en-US" dirty="0"/>
           </a:p>
@@ -21812,7 +21831,7 @@
           <a:p>
             <a:fld id="{A7119916-CD40-456D-ABE3-55F8822671F7}" type="datetime1">
               <a:rPr lang="en-US" smtClean="0"/>
-              <a:t>4/13/2022</a:t>
+              <a:t>10/9/2023</a:t>
             </a:fld>
             <a:endParaRPr lang="en-US" dirty="0"/>
           </a:p>
@@ -22060,7 +22079,7 @@
           <a:p>
             <a:fld id="{F8F3720D-B69F-4A94-83B7-6D73A5F7EAD8}" type="datetime1">
               <a:rPr lang="en-US" smtClean="0"/>
-              <a:t>4/13/2022</a:t>
+              <a:t>10/9/2023</a:t>
             </a:fld>
             <a:endParaRPr lang="en-US" dirty="0"/>
           </a:p>

</xml_diff>

<commit_message>
various updates while teaching, updating for wxPython
</commit_message>
<xml_diff>
--- a/one_session_overview/Introduction_Overview.pptx
+++ b/one_session_overview/Introduction_Overview.pptx
@@ -270,7 +270,7 @@
           <a:p>
             <a:fld id="{A7D9A7DC-F1CD-4708-A473-876A4B3B8934}" type="datetime1">
               <a:rPr lang="en-US" smtClean="0"/>
-              <a:t>10/9/2023</a:t>
+              <a:t>10/19/2023</a:t>
             </a:fld>
             <a:endParaRPr lang="en-US" dirty="0"/>
           </a:p>
@@ -454,7 +454,7 @@
           <a:p>
             <a:fld id="{A596092B-28C7-44D1-B902-5437B333DFB7}" type="datetime1">
               <a:rPr lang="en-US" smtClean="0"/>
-              <a:t>10/9/2023</a:t>
+              <a:t>10/19/2023</a:t>
             </a:fld>
             <a:endParaRPr lang="en-US" dirty="0"/>
           </a:p>
@@ -812,7 +812,7 @@
           <a:p>
             <a:fld id="{A596092B-28C7-44D1-B902-5437B333DFB7}" type="datetime1">
               <a:rPr lang="en-US" smtClean="0"/>
-              <a:t>10/9/2023</a:t>
+              <a:t>10/19/2023</a:t>
             </a:fld>
             <a:endParaRPr lang="en-US" dirty="0"/>
           </a:p>
@@ -963,7 +963,7 @@
           <a:p>
             <a:fld id="{A596092B-28C7-44D1-B902-5437B333DFB7}" type="datetime1">
               <a:rPr lang="en-US" smtClean="0"/>
-              <a:t>10/9/2023</a:t>
+              <a:t>10/19/2023</a:t>
             </a:fld>
             <a:endParaRPr lang="en-US" dirty="0"/>
           </a:p>
@@ -1114,7 +1114,7 @@
           <a:p>
             <a:fld id="{A596092B-28C7-44D1-B902-5437B333DFB7}" type="datetime1">
               <a:rPr lang="en-US" smtClean="0"/>
-              <a:t>10/9/2023</a:t>
+              <a:t>10/19/2023</a:t>
             </a:fld>
             <a:endParaRPr lang="en-US" dirty="0"/>
           </a:p>
@@ -1265,7 +1265,7 @@
           <a:p>
             <a:fld id="{A596092B-28C7-44D1-B902-5437B333DFB7}" type="datetime1">
               <a:rPr lang="en-US" smtClean="0"/>
-              <a:t>10/9/2023</a:t>
+              <a:t>10/19/2023</a:t>
             </a:fld>
             <a:endParaRPr lang="en-US" dirty="0"/>
           </a:p>
@@ -1416,7 +1416,7 @@
           <a:p>
             <a:fld id="{A596092B-28C7-44D1-B902-5437B333DFB7}" type="datetime1">
               <a:rPr lang="en-US" smtClean="0"/>
-              <a:t>10/9/2023</a:t>
+              <a:t>10/19/2023</a:t>
             </a:fld>
             <a:endParaRPr lang="en-US" dirty="0"/>
           </a:p>
@@ -1585,7 +1585,7 @@
           <a:p>
             <a:fld id="{A596092B-28C7-44D1-B902-5437B333DFB7}" type="datetime1">
               <a:rPr lang="en-US" smtClean="0"/>
-              <a:t>10/9/2023</a:t>
+              <a:t>10/19/2023</a:t>
             </a:fld>
             <a:endParaRPr lang="en-US" dirty="0"/>
           </a:p>
@@ -1831,7 +1831,7 @@
                 <a:tabLst/>
                 <a:defRPr/>
               </a:pPr>
-              <a:t>10/9/2023</a:t>
+              <a:t>10/19/2023</a:t>
             </a:fld>
             <a:endParaRPr kumimoji="0" lang="en-US" sz="1200" b="0" i="0" u="none" strike="noStrike" kern="1200" cap="none" spc="0" normalizeH="0" baseline="0" noProof="0" dirty="0">
               <a:ln>
@@ -2177,7 +2177,7 @@
                 <a:tabLst/>
                 <a:defRPr/>
               </a:pPr>
-              <a:t>10/9/2023</a:t>
+              <a:t>10/19/2023</a:t>
             </a:fld>
             <a:endParaRPr kumimoji="0" lang="en-US" sz="1200" b="0" i="0" u="none" strike="noStrike" kern="1200" cap="none" spc="0" normalizeH="0" baseline="0" noProof="0" dirty="0">
               <a:ln>
@@ -2538,7 +2538,7 @@
                 <a:tabLst/>
                 <a:defRPr/>
               </a:pPr>
-              <a:t>10/9/2023</a:t>
+              <a:t>10/19/2023</a:t>
             </a:fld>
             <a:endParaRPr kumimoji="0" lang="en-US" sz="1200" b="0" i="0" u="none" strike="noStrike" kern="1200" cap="none" spc="0" normalizeH="0" baseline="0" noProof="0" dirty="0">
               <a:ln>
@@ -2890,7 +2890,7 @@
                 <a:tabLst/>
                 <a:defRPr/>
               </a:pPr>
-              <a:t>10/9/2023</a:t>
+              <a:t>10/19/2023</a:t>
             </a:fld>
             <a:endParaRPr kumimoji="0" lang="en-US" sz="1200" b="0" i="0" u="none" strike="noStrike" kern="1200" cap="none" spc="0" normalizeH="0" baseline="0" noProof="0" dirty="0">
               <a:ln>
@@ -3221,7 +3221,7 @@
                 <a:tabLst/>
                 <a:defRPr/>
               </a:pPr>
-              <a:t>10/9/2023</a:t>
+              <a:t>10/19/2023</a:t>
             </a:fld>
             <a:endParaRPr kumimoji="0" lang="en-US" sz="1200" b="0" i="0" u="none" strike="noStrike" kern="1200" cap="none" spc="0" normalizeH="0" baseline="0" noProof="0" dirty="0">
               <a:ln>
@@ -3493,7 +3493,7 @@
           <a:p>
             <a:fld id="{A596092B-28C7-44D1-B902-5437B333DFB7}" type="datetime1">
               <a:rPr lang="en-US" smtClean="0"/>
-              <a:t>10/9/2023</a:t>
+              <a:t>10/19/2023</a:t>
             </a:fld>
             <a:endParaRPr lang="en-US" dirty="0"/>
           </a:p>
@@ -3728,7 +3728,7 @@
                 <a:tabLst/>
                 <a:defRPr/>
               </a:pPr>
-              <a:t>10/9/2023</a:t>
+              <a:t>10/19/2023</a:t>
             </a:fld>
             <a:endParaRPr kumimoji="0" lang="en-US" sz="1200" b="0" i="0" u="none" strike="noStrike" kern="1200" cap="none" spc="0" normalizeH="0" baseline="0" noProof="0" dirty="0">
               <a:ln>
@@ -4066,7 +4066,7 @@
                 <a:tabLst/>
                 <a:defRPr/>
               </a:pPr>
-              <a:t>10/9/2023</a:t>
+              <a:t>10/19/2023</a:t>
             </a:fld>
             <a:endParaRPr kumimoji="0" lang="en-US" sz="1200" b="0" i="0" u="none" strike="noStrike" kern="1200" cap="none" spc="0" normalizeH="0" baseline="0" noProof="0" dirty="0">
               <a:ln>
@@ -4320,7 +4320,7 @@
           <a:p>
             <a:fld id="{A596092B-28C7-44D1-B902-5437B333DFB7}" type="datetime1">
               <a:rPr lang="en-US" smtClean="0"/>
-              <a:t>10/9/2023</a:t>
+              <a:t>10/19/2023</a:t>
             </a:fld>
             <a:endParaRPr lang="en-US" dirty="0"/>
           </a:p>
@@ -4474,7 +4474,7 @@
           <a:p>
             <a:fld id="{A596092B-28C7-44D1-B902-5437B333DFB7}" type="datetime1">
               <a:rPr lang="en-US" smtClean="0"/>
-              <a:t>10/9/2023</a:t>
+              <a:t>10/19/2023</a:t>
             </a:fld>
             <a:endParaRPr lang="en-US" dirty="0"/>
           </a:p>
@@ -4628,7 +4628,7 @@
           <a:p>
             <a:fld id="{A596092B-28C7-44D1-B902-5437B333DFB7}" type="datetime1">
               <a:rPr lang="en-US" smtClean="0"/>
-              <a:t>10/9/2023</a:t>
+              <a:t>10/19/2023</a:t>
             </a:fld>
             <a:endParaRPr lang="en-US" dirty="0"/>
           </a:p>
@@ -4779,7 +4779,7 @@
           <a:p>
             <a:fld id="{A596092B-28C7-44D1-B902-5437B333DFB7}" type="datetime1">
               <a:rPr lang="en-US" smtClean="0"/>
-              <a:t>10/9/2023</a:t>
+              <a:t>10/19/2023</a:t>
             </a:fld>
             <a:endParaRPr lang="en-US" dirty="0"/>
           </a:p>
@@ -4933,7 +4933,7 @@
           <a:p>
             <a:fld id="{A596092B-28C7-44D1-B902-5437B333DFB7}" type="datetime1">
               <a:rPr lang="en-US" smtClean="0"/>
-              <a:t>10/9/2023</a:t>
+              <a:t>10/19/2023</a:t>
             </a:fld>
             <a:endParaRPr lang="en-US" dirty="0"/>
           </a:p>
@@ -5093,7 +5093,7 @@
           <a:p>
             <a:fld id="{A596092B-28C7-44D1-B902-5437B333DFB7}" type="datetime1">
               <a:rPr lang="en-US" smtClean="0"/>
-              <a:t>10/9/2023</a:t>
+              <a:t>10/19/2023</a:t>
             </a:fld>
             <a:endParaRPr lang="en-US" dirty="0"/>
           </a:p>
@@ -5247,7 +5247,7 @@
           <a:p>
             <a:fld id="{A596092B-28C7-44D1-B902-5437B333DFB7}" type="datetime1">
               <a:rPr lang="en-US" smtClean="0"/>
-              <a:t>10/9/2023</a:t>
+              <a:t>10/19/2023</a:t>
             </a:fld>
             <a:endParaRPr lang="en-US" dirty="0"/>
           </a:p>
@@ -5401,7 +5401,7 @@
           <a:p>
             <a:fld id="{A596092B-28C7-44D1-B902-5437B333DFB7}" type="datetime1">
               <a:rPr lang="en-US" smtClean="0"/>
-              <a:t>10/9/2023</a:t>
+              <a:t>10/19/2023</a:t>
             </a:fld>
             <a:endParaRPr lang="en-US" dirty="0"/>
           </a:p>
@@ -6187,7 +6187,7 @@
           <a:p>
             <a:fld id="{B1DF5501-EE91-4443-9D3B-24E6F28D34E2}" type="datetime1">
               <a:rPr lang="en-US" smtClean="0"/>
-              <a:t>10/9/2023</a:t>
+              <a:t>10/19/2023</a:t>
             </a:fld>
             <a:endParaRPr lang="en-US" dirty="0"/>
           </a:p>
@@ -6453,7 +6453,7 @@
           <a:p>
             <a:fld id="{E954E1E9-8456-43AD-BA28-861520D256B9}" type="datetime1">
               <a:rPr lang="en-US" smtClean="0"/>
-              <a:t>10/9/2023</a:t>
+              <a:t>10/19/2023</a:t>
             </a:fld>
             <a:endParaRPr lang="en-US" dirty="0"/>
           </a:p>
@@ -6771,7 +6771,7 @@
           <a:p>
             <a:fld id="{FAF31E0C-AAFD-4E63-B3AE-16CD757951F4}" type="datetime1">
               <a:rPr lang="en-US" smtClean="0"/>
-              <a:t>10/9/2023</a:t>
+              <a:t>10/19/2023</a:t>
             </a:fld>
             <a:endParaRPr lang="en-US" dirty="0"/>
           </a:p>
@@ -7116,7 +7116,7 @@
           <a:p>
             <a:fld id="{000084FF-4715-4B6E-BD22-453621E5873F}" type="datetime1">
               <a:rPr lang="en-US" smtClean="0"/>
-              <a:t>10/9/2023</a:t>
+              <a:t>10/19/2023</a:t>
             </a:fld>
             <a:endParaRPr lang="en-US" dirty="0"/>
           </a:p>
@@ -7434,7 +7434,7 @@
           <a:p>
             <a:fld id="{6AC37F8D-4DF5-4AB6-A766-5A84B3D74A3B}" type="datetime1">
               <a:rPr lang="en-US" smtClean="0"/>
-              <a:t>10/9/2023</a:t>
+              <a:t>10/19/2023</a:t>
             </a:fld>
             <a:endParaRPr lang="en-US" dirty="0"/>
           </a:p>
@@ -7831,7 +7831,7 @@
           <a:p>
             <a:fld id="{1BF3CD1A-162D-40B2-9B22-9056F77C27F2}" type="datetime1">
               <a:rPr lang="en-US" smtClean="0"/>
-              <a:t>10/9/2023</a:t>
+              <a:t>10/19/2023</a:t>
             </a:fld>
             <a:endParaRPr lang="en-US" dirty="0"/>
           </a:p>
@@ -8005,7 +8005,7 @@
           <a:p>
             <a:fld id="{D42E4200-B1E5-4E39-8279-05DD69810A37}" type="datetime1">
               <a:rPr lang="en-US" smtClean="0"/>
-              <a:t>10/9/2023</a:t>
+              <a:t>10/19/2023</a:t>
             </a:fld>
             <a:endParaRPr lang="en-US" dirty="0"/>
           </a:p>
@@ -8188,7 +8188,7 @@
           <a:p>
             <a:fld id="{47CF7895-00AC-42E5-9790-7B0E3CE09DF2}" type="datetime1">
               <a:rPr lang="en-US" smtClean="0"/>
-              <a:t>10/9/2023</a:t>
+              <a:t>10/19/2023</a:t>
             </a:fld>
             <a:endParaRPr lang="en-US" dirty="0"/>
           </a:p>
@@ -8367,7 +8367,7 @@
           <a:p>
             <a:fld id="{A7119916-CD40-456D-ABE3-55F8822671F7}" type="datetime1">
               <a:rPr lang="en-US" smtClean="0"/>
-              <a:t>10/9/2023</a:t>
+              <a:t>10/19/2023</a:t>
             </a:fld>
             <a:endParaRPr lang="en-US" dirty="0"/>
           </a:p>
@@ -8617,7 +8617,7 @@
           <a:p>
             <a:fld id="{3F9A13D6-B8C2-463B-B3F7-C62E098B328E}" type="datetime1">
               <a:rPr lang="en-US" smtClean="0"/>
-              <a:t>10/9/2023</a:t>
+              <a:t>10/19/2023</a:t>
             </a:fld>
             <a:endParaRPr lang="en-US" dirty="0"/>
           </a:p>
@@ -8852,7 +8852,7 @@
           <a:p>
             <a:fld id="{D2B63420-31EE-4E4B-911C-2601B14D9FDD}" type="datetime1">
               <a:rPr lang="en-US" smtClean="0"/>
-              <a:t>10/9/2023</a:t>
+              <a:t>10/19/2023</a:t>
             </a:fld>
             <a:endParaRPr lang="en-US" dirty="0"/>
           </a:p>
@@ -9229,7 +9229,7 @@
           <a:p>
             <a:fld id="{2DD8986D-86F8-41E6-8CFF-8C91AEF92622}" type="datetime1">
               <a:rPr lang="en-US" smtClean="0"/>
-              <a:t>10/9/2023</a:t>
+              <a:t>10/19/2023</a:t>
             </a:fld>
             <a:endParaRPr lang="en-US" dirty="0"/>
           </a:p>
@@ -9355,7 +9355,7 @@
           <a:p>
             <a:fld id="{BA885161-032E-4C6A-8EDA-39D168DF18E4}" type="datetime1">
               <a:rPr lang="en-US" smtClean="0"/>
-              <a:t>10/9/2023</a:t>
+              <a:t>10/19/2023</a:t>
             </a:fld>
             <a:endParaRPr lang="en-US" dirty="0"/>
           </a:p>
@@ -9453,7 +9453,7 @@
           <a:p>
             <a:fld id="{958E6740-E523-48D9-9C4E-6F218E87BAF3}" type="datetime1">
               <a:rPr lang="en-US" smtClean="0"/>
-              <a:t>10/9/2023</a:t>
+              <a:t>10/19/2023</a:t>
             </a:fld>
             <a:endParaRPr lang="en-US" dirty="0"/>
           </a:p>
@@ -9711,7 +9711,7 @@
           <a:p>
             <a:fld id="{6121D4CA-FF09-4CB8-8D51-2613D19A0F2E}" type="datetime1">
               <a:rPr lang="en-US" smtClean="0"/>
-              <a:t>10/9/2023</a:t>
+              <a:t>10/19/2023</a:t>
             </a:fld>
             <a:endParaRPr lang="en-US" dirty="0"/>
           </a:p>
@@ -9976,7 +9976,7 @@
           <a:p>
             <a:fld id="{8C4779EA-AEA7-43B3-9B65-A77E9A890421}" type="datetime1">
               <a:rPr lang="en-US" smtClean="0"/>
-              <a:t>10/9/2023</a:t>
+              <a:t>10/19/2023</a:t>
             </a:fld>
             <a:endParaRPr lang="en-US" dirty="0"/>
           </a:p>
@@ -10722,7 +10722,7 @@
           <a:p>
             <a:fld id="{059A67F1-3EA0-4026-BE6A-31EE4E1B1DB5}" type="datetime1">
               <a:rPr lang="en-US" smtClean="0"/>
-              <a:t>10/9/2023</a:t>
+              <a:t>10/19/2023</a:t>
             </a:fld>
             <a:endParaRPr lang="en-US" dirty="0"/>
           </a:p>
@@ -11319,7 +11319,7 @@
           <a:p>
             <a:fld id="{0F09E55C-CECE-4F47-839C-0667B2307420}" type="datetime1">
               <a:rPr lang="en-US" smtClean="0"/>
-              <a:t>10/9/2023</a:t>
+              <a:t>10/19/2023</a:t>
             </a:fld>
             <a:endParaRPr lang="en-US" dirty="0"/>
           </a:p>
@@ -11644,7 +11644,7 @@
           <a:p>
             <a:fld id="{F8F3720D-B69F-4A94-83B7-6D73A5F7EAD8}" type="datetime1">
               <a:rPr lang="en-US" smtClean="0"/>
-              <a:t>10/9/2023</a:t>
+              <a:t>10/19/2023</a:t>
             </a:fld>
             <a:endParaRPr lang="en-US" dirty="0"/>
           </a:p>
@@ -11846,7 +11846,7 @@
           <a:p>
             <a:fld id="{A7119916-CD40-456D-ABE3-55F8822671F7}" type="datetime1">
               <a:rPr lang="en-US" smtClean="0"/>
-              <a:t>10/9/2023</a:t>
+              <a:t>10/19/2023</a:t>
             </a:fld>
             <a:endParaRPr lang="en-US" dirty="0"/>
           </a:p>
@@ -12071,7 +12071,7 @@
           <a:p>
             <a:fld id="{0B07C6D0-642C-4A40-B0F1-13ED56048173}" type="datetime1">
               <a:rPr lang="en-US" smtClean="0"/>
-              <a:t>10/9/2023</a:t>
+              <a:t>10/19/2023</a:t>
             </a:fld>
             <a:endParaRPr lang="en-US" dirty="0"/>
           </a:p>
@@ -12292,7 +12292,7 @@
           <a:p>
             <a:fld id="{0B07C6D0-642C-4A40-B0F1-13ED56048173}" type="datetime1">
               <a:rPr lang="en-US" smtClean="0"/>
-              <a:t>10/9/2023</a:t>
+              <a:t>10/19/2023</a:t>
             </a:fld>
             <a:endParaRPr lang="en-US" dirty="0"/>
           </a:p>
@@ -12496,7 +12496,7 @@
           <a:p>
             <a:fld id="{A7119916-CD40-456D-ABE3-55F8822671F7}" type="datetime1">
               <a:rPr lang="en-US" smtClean="0"/>
-              <a:t>10/9/2023</a:t>
+              <a:t>10/19/2023</a:t>
             </a:fld>
             <a:endParaRPr lang="en-US" dirty="0"/>
           </a:p>
@@ -12706,7 +12706,7 @@
           <a:p>
             <a:fld id="{0B07C6D0-642C-4A40-B0F1-13ED56048173}" type="datetime1">
               <a:rPr lang="en-US" smtClean="0"/>
-              <a:t>10/9/2023</a:t>
+              <a:t>10/19/2023</a:t>
             </a:fld>
             <a:endParaRPr lang="en-US" dirty="0"/>
           </a:p>
@@ -12882,7 +12882,7 @@
           <a:p>
             <a:fld id="{A7119916-CD40-456D-ABE3-55F8822671F7}" type="datetime1">
               <a:rPr lang="en-US" smtClean="0"/>
-              <a:t>10/9/2023</a:t>
+              <a:t>10/19/2023</a:t>
             </a:fld>
             <a:endParaRPr lang="en-US" dirty="0"/>
           </a:p>
@@ -13124,7 +13124,7 @@
           <a:p>
             <a:fld id="{A7119916-CD40-456D-ABE3-55F8822671F7}" type="datetime1">
               <a:rPr lang="en-US" smtClean="0"/>
-              <a:t>10/9/2023</a:t>
+              <a:t>10/19/2023</a:t>
             </a:fld>
             <a:endParaRPr lang="en-US" dirty="0"/>
           </a:p>
@@ -13424,7 +13424,7 @@
           <a:p>
             <a:fld id="{A7119916-CD40-456D-ABE3-55F8822671F7}" type="datetime1">
               <a:rPr lang="en-US" smtClean="0"/>
-              <a:t>10/9/2023</a:t>
+              <a:t>10/19/2023</a:t>
             </a:fld>
             <a:endParaRPr lang="en-US" dirty="0"/>
           </a:p>
@@ -13697,7 +13697,7 @@
           <a:p>
             <a:fld id="{A7119916-CD40-456D-ABE3-55F8822671F7}" type="datetime1">
               <a:rPr lang="en-US" smtClean="0"/>
-              <a:t>10/9/2023</a:t>
+              <a:t>10/19/2023</a:t>
             </a:fld>
             <a:endParaRPr lang="en-US" dirty="0"/>
           </a:p>
@@ -13923,7 +13923,7 @@
           <a:p>
             <a:fld id="{17F33E47-61B9-4B4D-8325-8788C9EC3005}" type="datetime1">
               <a:rPr lang="en-US" smtClean="0"/>
-              <a:t>10/9/2023</a:t>
+              <a:t>10/19/2023</a:t>
             </a:fld>
             <a:endParaRPr lang="en-US" dirty="0"/>
           </a:p>
@@ -14174,7 +14174,7 @@
           <a:p>
             <a:fld id="{A7119916-CD40-456D-ABE3-55F8822671F7}" type="datetime1">
               <a:rPr lang="en-US" smtClean="0"/>
-              <a:t>10/9/2023</a:t>
+              <a:t>10/19/2023</a:t>
             </a:fld>
             <a:endParaRPr lang="en-US" dirty="0"/>
           </a:p>
@@ -14468,7 +14468,7 @@
           <a:p>
             <a:fld id="{A7119916-CD40-456D-ABE3-55F8822671F7}" type="datetime1">
               <a:rPr lang="en-US" smtClean="0"/>
-              <a:t>10/9/2023</a:t>
+              <a:t>10/19/2023</a:t>
             </a:fld>
             <a:endParaRPr lang="en-US" dirty="0"/>
           </a:p>
@@ -14726,7 +14726,7 @@
           <a:p>
             <a:fld id="{A7119916-CD40-456D-ABE3-55F8822671F7}" type="datetime1">
               <a:rPr lang="en-US" smtClean="0"/>
-              <a:t>10/9/2023</a:t>
+              <a:t>10/19/2023</a:t>
             </a:fld>
             <a:endParaRPr lang="en-US" dirty="0"/>
           </a:p>
@@ -15046,7 +15046,7 @@
           <a:p>
             <a:fld id="{A7119916-CD40-456D-ABE3-55F8822671F7}" type="datetime1">
               <a:rPr lang="en-US" smtClean="0"/>
-              <a:t>10/9/2023</a:t>
+              <a:t>10/19/2023</a:t>
             </a:fld>
             <a:endParaRPr lang="en-US" dirty="0"/>
           </a:p>
@@ -15315,7 +15315,7 @@
           <a:p>
             <a:fld id="{A7119916-CD40-456D-ABE3-55F8822671F7}" type="datetime1">
               <a:rPr lang="en-US" smtClean="0"/>
-              <a:t>10/9/2023</a:t>
+              <a:t>10/19/2023</a:t>
             </a:fld>
             <a:endParaRPr lang="en-US" dirty="0"/>
           </a:p>
@@ -15573,7 +15573,7 @@
           <a:p>
             <a:fld id="{A7119916-CD40-456D-ABE3-55F8822671F7}" type="datetime1">
               <a:rPr lang="en-US" smtClean="0"/>
-              <a:t>10/9/2023</a:t>
+              <a:t>10/19/2023</a:t>
             </a:fld>
             <a:endParaRPr lang="en-US" dirty="0"/>
           </a:p>
@@ -15822,7 +15822,7 @@
           <a:p>
             <a:fld id="{A7119916-CD40-456D-ABE3-55F8822671F7}" type="datetime1">
               <a:rPr lang="en-US" smtClean="0"/>
-              <a:t>10/9/2023</a:t>
+              <a:t>10/19/2023</a:t>
             </a:fld>
             <a:endParaRPr lang="en-US" dirty="0"/>
           </a:p>
@@ -16171,7 +16171,7 @@
           <a:p>
             <a:fld id="{0B07C6D0-642C-4A40-B0F1-13ED56048173}" type="datetime1">
               <a:rPr lang="en-US" smtClean="0"/>
-              <a:t>10/9/2023</a:t>
+              <a:t>10/19/2023</a:t>
             </a:fld>
             <a:endParaRPr lang="en-US" dirty="0"/>
           </a:p>
@@ -16525,7 +16525,7 @@
           <a:p>
             <a:fld id="{0B07C6D0-642C-4A40-B0F1-13ED56048173}" type="datetime1">
               <a:rPr lang="en-US" smtClean="0"/>
-              <a:t>10/9/2023</a:t>
+              <a:t>10/19/2023</a:t>
             </a:fld>
             <a:endParaRPr lang="en-US" dirty="0"/>
           </a:p>
@@ -16714,7 +16714,7 @@
           <a:p>
             <a:fld id="{A7119916-CD40-456D-ABE3-55F8822671F7}" type="datetime1">
               <a:rPr lang="en-US" smtClean="0"/>
-              <a:t>10/9/2023</a:t>
+              <a:t>10/19/2023</a:t>
             </a:fld>
             <a:endParaRPr lang="en-US" dirty="0"/>
           </a:p>
@@ -16908,7 +16908,7 @@
           <a:p>
             <a:fld id="{B428F5A7-20F3-4981-866F-DD0AA3B623E8}" type="datetime1">
               <a:rPr lang="en-US" smtClean="0"/>
-              <a:t>10/9/2023</a:t>
+              <a:t>10/19/2023</a:t>
             </a:fld>
             <a:endParaRPr lang="en-US" dirty="0"/>
           </a:p>
@@ -17208,7 +17208,7 @@
                 <a:tabLst/>
                 <a:defRPr/>
               </a:pPr>
-              <a:t>10/9/2023</a:t>
+              <a:t>10/19/2023</a:t>
             </a:fld>
             <a:endParaRPr kumimoji="0" lang="en-US" sz="900" b="0" i="0" u="none" strike="noStrike" kern="1200" cap="none" spc="0" normalizeH="0" baseline="0" noProof="0" dirty="0">
               <a:ln>
@@ -17570,7 +17570,7 @@
                 <a:tabLst/>
                 <a:defRPr/>
               </a:pPr>
-              <a:t>10/9/2023</a:t>
+              <a:t>10/19/2023</a:t>
             </a:fld>
             <a:endParaRPr kumimoji="0" lang="en-US" sz="900" b="0" i="0" u="none" strike="noStrike" kern="1200" cap="none" spc="0" normalizeH="0" baseline="0" noProof="0" dirty="0">
               <a:ln>
@@ -17939,7 +17939,7 @@
                 <a:tabLst/>
                 <a:defRPr/>
               </a:pPr>
-              <a:t>10/9/2023</a:t>
+              <a:t>10/19/2023</a:t>
             </a:fld>
             <a:endParaRPr kumimoji="0" lang="en-US" sz="900" b="0" i="0" u="none" strike="noStrike" kern="1200" cap="none" spc="0" normalizeH="0" baseline="0" noProof="0" dirty="0">
               <a:ln>
@@ -18444,7 +18444,7 @@
                 <a:tabLst/>
                 <a:defRPr/>
               </a:pPr>
-              <a:t>10/9/2023</a:t>
+              <a:t>10/19/2023</a:t>
             </a:fld>
             <a:endParaRPr kumimoji="0" lang="en-US" sz="900" b="0" i="0" u="none" strike="noStrike" kern="1200" cap="none" spc="0" normalizeH="0" baseline="0" noProof="0" dirty="0">
               <a:ln>
@@ -18762,7 +18762,7 @@
           <a:p>
             <a:fld id="{A7119916-CD40-456D-ABE3-55F8822671F7}" type="datetime1">
               <a:rPr lang="en-US" smtClean="0"/>
-              <a:t>10/9/2023</a:t>
+              <a:t>10/19/2023</a:t>
             </a:fld>
             <a:endParaRPr lang="en-US" dirty="0"/>
           </a:p>
@@ -19032,7 +19032,7 @@
                 <a:tabLst/>
                 <a:defRPr/>
               </a:pPr>
-              <a:t>10/9/2023</a:t>
+              <a:t>10/19/2023</a:t>
             </a:fld>
             <a:endParaRPr kumimoji="0" lang="en-US" sz="900" b="0" i="0" u="none" strike="noStrike" kern="1200" cap="none" spc="0" normalizeH="0" baseline="0" noProof="0" dirty="0">
               <a:ln>
@@ -19402,7 +19402,7 @@
                 <a:tabLst/>
                 <a:defRPr/>
               </a:pPr>
-              <a:t>10/9/2023</a:t>
+              <a:t>10/19/2023</a:t>
             </a:fld>
             <a:endParaRPr kumimoji="0" lang="en-US" sz="900" b="0" i="0" u="none" strike="noStrike" kern="1200" cap="none" spc="0" normalizeH="0" baseline="0" noProof="0" dirty="0">
               <a:ln>
@@ -19839,7 +19839,7 @@
                 <a:tabLst/>
                 <a:defRPr/>
               </a:pPr>
-              <a:t>10/9/2023</a:t>
+              <a:t>10/19/2023</a:t>
             </a:fld>
             <a:endParaRPr kumimoji="0" lang="en-US" sz="900" b="0" i="0" u="none" strike="noStrike" kern="1200" cap="none" spc="0" normalizeH="0" baseline="0" noProof="0" dirty="0">
               <a:ln>
@@ -20225,7 +20225,7 @@
                 <a:tabLst/>
                 <a:defRPr/>
               </a:pPr>
-              <a:t>10/9/2023</a:t>
+              <a:t>10/19/2023</a:t>
             </a:fld>
             <a:endParaRPr kumimoji="0" lang="en-US" sz="900" b="0" i="0" u="none" strike="noStrike" kern="1200" cap="none" spc="0" normalizeH="0" baseline="0" noProof="0" dirty="0">
               <a:ln>
@@ -20516,7 +20516,7 @@
           <a:p>
             <a:fld id="{A7119916-CD40-456D-ABE3-55F8822671F7}" type="datetime1">
               <a:rPr lang="en-US" smtClean="0"/>
-              <a:t>10/9/2023</a:t>
+              <a:t>10/19/2023</a:t>
             </a:fld>
             <a:endParaRPr lang="en-US" dirty="0"/>
           </a:p>
@@ -20672,7 +20672,9 @@
         </p:nvSpPr>
         <p:spPr/>
         <p:txBody>
-          <a:bodyPr/>
+          <a:bodyPr>
+            <a:normAutofit/>
+          </a:bodyPr>
           <a:lstStyle/>
           <a:p>
             <a:r>
@@ -20683,7 +20685,7 @@
           <a:p>
             <a:r>
               <a:rPr lang="en-US" sz="3600" dirty="0"/>
-              <a:t>Disable own video – too many reduces clarity- Unless </a:t>
+              <a:t>RAISE HAND when </a:t>
             </a:r>
             <a:r>
               <a:rPr lang="en-US" sz="3600" dirty="0">
@@ -20737,7 +20739,7 @@
           <a:p>
             <a:fld id="{17F33E47-61B9-4B4D-8325-8788C9EC3005}" type="datetime1">
               <a:rPr lang="en-US" smtClean="0"/>
-              <a:t>10/9/2023</a:t>
+              <a:t>10/19/2023</a:t>
             </a:fld>
             <a:endParaRPr lang="en-US" dirty="0"/>
           </a:p>
@@ -20888,7 +20890,7 @@
           <a:p>
             <a:fld id="{A7119916-CD40-456D-ABE3-55F8822671F7}" type="datetime1">
               <a:rPr lang="en-US" smtClean="0"/>
-              <a:t>10/9/2023</a:t>
+              <a:t>10/19/2023</a:t>
             </a:fld>
             <a:endParaRPr lang="en-US" dirty="0"/>
           </a:p>
@@ -21141,7 +21143,7 @@
           <a:p>
             <a:fld id="{0B07C6D0-642C-4A40-B0F1-13ED56048173}" type="datetime1">
               <a:rPr lang="en-US" smtClean="0"/>
-              <a:t>10/9/2023</a:t>
+              <a:t>10/19/2023</a:t>
             </a:fld>
             <a:endParaRPr lang="en-US" dirty="0"/>
           </a:p>
@@ -21385,7 +21387,7 @@
           <a:p>
             <a:fld id="{A7119916-CD40-456D-ABE3-55F8822671F7}" type="datetime1">
               <a:rPr lang="en-US" smtClean="0"/>
-              <a:t>10/9/2023</a:t>
+              <a:t>10/19/2023</a:t>
             </a:fld>
             <a:endParaRPr lang="en-US" dirty="0"/>
           </a:p>
@@ -21611,7 +21613,7 @@
           <a:p>
             <a:fld id="{52E41419-A9A0-4E48-99EF-6542B4AE3C79}" type="datetime1">
               <a:rPr lang="en-US" smtClean="0"/>
-              <a:t>10/9/2023</a:t>
+              <a:t>10/19/2023</a:t>
             </a:fld>
             <a:endParaRPr lang="en-US" dirty="0"/>
           </a:p>
@@ -21831,7 +21833,7 @@
           <a:p>
             <a:fld id="{A7119916-CD40-456D-ABE3-55F8822671F7}" type="datetime1">
               <a:rPr lang="en-US" smtClean="0"/>
-              <a:t>10/9/2023</a:t>
+              <a:t>10/19/2023</a:t>
             </a:fld>
             <a:endParaRPr lang="en-US" dirty="0"/>
           </a:p>
@@ -22079,7 +22081,7 @@
           <a:p>
             <a:fld id="{F8F3720D-B69F-4A94-83B7-6D73A5F7EAD8}" type="datetime1">
               <a:rPr lang="en-US" smtClean="0"/>
-              <a:t>10/9/2023</a:t>
+              <a:t>10/19/2023</a:t>
             </a:fld>
             <a:endParaRPr lang="en-US" dirty="0"/>
           </a:p>

</xml_diff>